<commit_message>
ERD and SQL table added
</commit_message>
<xml_diff>
--- a/Database/ERDDiagram.pptx
+++ b/Database/ERDDiagram.pptx
@@ -5,9 +5,7 @@
     <p:sldMasterId id="2147483648" r:id="rId1"/>
   </p:sldMasterIdLst>
   <p:sldIdLst>
-    <p:sldId id="256" r:id="rId2"/>
-    <p:sldId id="257" r:id="rId3"/>
-    <p:sldId id="258" r:id="rId4"/>
+    <p:sldId id="257" r:id="rId2"/>
   </p:sldIdLst>
   <p:sldSz cx="12192000" cy="6858000"/>
   <p:notesSz cx="6858000" cy="9144000"/>
@@ -2913,69 +2911,6 @@
       </p:grpSpPr>
       <p:sp>
         <p:nvSpPr>
-          <p:cNvPr id="2" name="Title 1"/>
-          <p:cNvSpPr>
-            <a:spLocks noGrp="1"/>
-          </p:cNvSpPr>
-          <p:nvPr>
-            <p:ph type="ctrTitle"/>
-          </p:nvPr>
-        </p:nvSpPr>
-        <p:spPr/>
-        <p:txBody>
-          <a:bodyPr/>
-          <a:lstStyle/>
-          <a:p>
-            <a:endParaRPr lang="en-CA"/>
-          </a:p>
-        </p:txBody>
-      </p:sp>
-      <p:sp>
-        <p:nvSpPr>
-          <p:cNvPr id="3" name="Subtitle 2"/>
-          <p:cNvSpPr>
-            <a:spLocks noGrp="1"/>
-          </p:cNvSpPr>
-          <p:nvPr>
-            <p:ph type="subTitle" idx="1"/>
-          </p:nvPr>
-        </p:nvSpPr>
-        <p:spPr/>
-        <p:txBody>
-          <a:bodyPr/>
-          <a:lstStyle/>
-          <a:p>
-            <a:endParaRPr lang="en-CA"/>
-          </a:p>
-        </p:txBody>
-      </p:sp>
-    </p:spTree>
-  </p:cSld>
-  <p:clrMapOvr>
-    <a:masterClrMapping/>
-  </p:clrMapOvr>
-</p:sld>
-</file>
-
-<file path=ppt/slides/slide2.xml><?xml version="1.0" encoding="utf-8"?>
-<p:sld xmlns:a="http://schemas.openxmlformats.org/drawingml/2006/main" xmlns:r="http://schemas.openxmlformats.org/officeDocument/2006/relationships" xmlns:p="http://schemas.openxmlformats.org/presentationml/2006/main">
-  <p:cSld>
-    <p:spTree>
-      <p:nvGrpSpPr>
-        <p:cNvPr id="1" name=""/>
-        <p:cNvGrpSpPr/>
-        <p:nvPr/>
-      </p:nvGrpSpPr>
-      <p:grpSpPr>
-        <a:xfrm>
-          <a:off x="0" y="0"/>
-          <a:ext cx="0" cy="0"/>
-          <a:chOff x="0" y="0"/>
-          <a:chExt cx="0" cy="0"/>
-        </a:xfrm>
-      </p:grpSpPr>
-      <p:sp>
-        <p:nvSpPr>
           <p:cNvPr id="4" name="TextBox 3"/>
           <p:cNvSpPr txBox="1"/>
           <p:nvPr/>
@@ -3051,15 +2986,7 @@
             </a:pPr>
             <a:r>
               <a:rPr lang="en-US" dirty="0"/>
-              <a:t>Status – int (0 - </a:t>
-            </a:r>
-            <a:r>
-              <a:rPr lang="en-US" dirty="0" err="1"/>
-              <a:t>Todo</a:t>
-            </a:r>
-            <a:r>
-              <a:rPr lang="en-US" dirty="0"/>
-              <a:t>, 1 - Doing, 2 – Done)</a:t>
+              <a:t>Status – varchar( To Do, Doing, Done)</a:t>
             </a:r>
             <a:endParaRPr lang="en-CA" dirty="0"/>
           </a:p>
@@ -3074,7 +3001,7 @@
         <p:spPr>
           <a:xfrm>
             <a:off x="5973189" y="665825"/>
-            <a:ext cx="2068497" cy="1754326"/>
+            <a:ext cx="2068497" cy="2585323"/>
           </a:xfrm>
           <a:prstGeom prst="rect">
             <a:avLst/>
@@ -3102,7 +3029,7 @@
           <a:p>
             <a:r>
               <a:rPr lang="en-US" b="1" dirty="0"/>
-              <a:t>Employees</a:t>
+              <a:t>Colleagues:</a:t>
             </a:r>
           </a:p>
           <a:p>
@@ -3121,8 +3048,12 @@
               <a:buChar char="-"/>
             </a:pPr>
             <a:r>
+              <a:rPr lang="en-US" dirty="0" err="1"/>
+              <a:t>Fname</a:t>
+            </a:r>
+            <a:r>
               <a:rPr lang="en-US" dirty="0"/>
-              <a:t>Name  - varchar</a:t>
+              <a:t>  - varchar</a:t>
             </a:r>
           </a:p>
           <a:p>
@@ -3131,8 +3062,42 @@
               <a:buChar char="-"/>
             </a:pPr>
             <a:r>
+              <a:rPr lang="en-US" dirty="0" err="1"/>
+              <a:t>Lname</a:t>
+            </a:r>
+            <a:r>
+              <a:rPr lang="en-US" dirty="0"/>
+              <a:t> – varchar</a:t>
+            </a:r>
+          </a:p>
+          <a:p>
+            <a:pPr marL="285750" indent="-285750">
+              <a:buFontTx/>
+              <a:buChar char="-"/>
+            </a:pPr>
+            <a:r>
               <a:rPr lang="en-US" dirty="0"/>
               <a:t>Department – varchar</a:t>
+            </a:r>
+          </a:p>
+          <a:p>
+            <a:pPr marL="285750" indent="-285750">
+              <a:buFontTx/>
+              <a:buChar char="-"/>
+            </a:pPr>
+            <a:r>
+              <a:rPr lang="en-US" dirty="0"/>
+              <a:t>Phone – Varchar</a:t>
+            </a:r>
+          </a:p>
+          <a:p>
+            <a:pPr marL="285750" indent="-285750">
+              <a:buFontTx/>
+              <a:buChar char="-"/>
+            </a:pPr>
+            <a:r>
+              <a:rPr lang="en-US" dirty="0"/>
+              <a:t>Email – Varchar</a:t>
             </a:r>
           </a:p>
         </p:txBody>
@@ -3174,7 +3139,7 @@
           <a:p>
             <a:r>
               <a:rPr lang="en-US" b="1" dirty="0" err="1"/>
-              <a:t>TasksxEmployees</a:t>
+              <a:t>TasksxColleagues</a:t>
             </a:r>
             <a:r>
               <a:rPr lang="en-US" b="1" dirty="0"/>
@@ -3236,7 +3201,7 @@
         <p:spPr>
           <a:xfrm>
             <a:off x="9111449" y="656947"/>
-            <a:ext cx="2068497" cy="2031325"/>
+            <a:ext cx="2068497" cy="2308324"/>
           </a:xfrm>
           <a:prstGeom prst="rect">
             <a:avLst/>
@@ -3264,7 +3229,7 @@
           <a:p>
             <a:r>
               <a:rPr lang="en-US" b="1" dirty="0"/>
-              <a:t>Discussion Topic</a:t>
+              <a:t>Discussions</a:t>
             </a:r>
           </a:p>
           <a:p>
@@ -3285,6 +3250,16 @@
             <a:r>
               <a:rPr lang="en-US" dirty="0"/>
               <a:t>Content – varchar</a:t>
+            </a:r>
+          </a:p>
+          <a:p>
+            <a:pPr marL="285750" indent="-285750">
+              <a:buFontTx/>
+              <a:buChar char="-"/>
+            </a:pPr>
+            <a:r>
+              <a:rPr lang="en-US" dirty="0"/>
+              <a:t>Topic – Varchar</a:t>
             </a:r>
           </a:p>
           <a:p>
@@ -3799,492 +3774,6 @@
 </p:sld>
 </file>
 
-<file path=ppt/slides/slide3.xml><?xml version="1.0" encoding="utf-8"?>
-<p:sld xmlns:a="http://schemas.openxmlformats.org/drawingml/2006/main" xmlns:r="http://schemas.openxmlformats.org/officeDocument/2006/relationships" xmlns:p="http://schemas.openxmlformats.org/presentationml/2006/main">
-  <p:cSld>
-    <p:spTree>
-      <p:nvGrpSpPr>
-        <p:cNvPr id="1" name=""/>
-        <p:cNvGrpSpPr/>
-        <p:nvPr/>
-      </p:nvGrpSpPr>
-      <p:grpSpPr>
-        <a:xfrm>
-          <a:off x="0" y="0"/>
-          <a:ext cx="0" cy="0"/>
-          <a:chOff x="0" y="0"/>
-          <a:chExt cx="0" cy="0"/>
-        </a:xfrm>
-      </p:grpSpPr>
-      <p:sp>
-        <p:nvSpPr>
-          <p:cNvPr id="4" name="TextBox 3"/>
-          <p:cNvSpPr txBox="1"/>
-          <p:nvPr/>
-        </p:nvSpPr>
-        <p:spPr>
-          <a:xfrm>
-            <a:off x="1651246" y="1805463"/>
-            <a:ext cx="2068497" cy="2031325"/>
-          </a:xfrm>
-          <a:prstGeom prst="rect">
-            <a:avLst/>
-          </a:prstGeom>
-        </p:spPr>
-        <p:style>
-          <a:lnRef idx="2">
-            <a:schemeClr val="dk1"/>
-          </a:lnRef>
-          <a:fillRef idx="1">
-            <a:schemeClr val="lt1"/>
-          </a:fillRef>
-          <a:effectRef idx="0">
-            <a:schemeClr val="dk1"/>
-          </a:effectRef>
-          <a:fontRef idx="minor">
-            <a:schemeClr val="dk1"/>
-          </a:fontRef>
-        </p:style>
-        <p:txBody>
-          <a:bodyPr wrap="square" rtlCol="0">
-            <a:spAutoFit/>
-          </a:bodyPr>
-          <a:lstStyle/>
-          <a:p>
-            <a:r>
-              <a:rPr lang="en-US" b="1" dirty="0"/>
-              <a:t>Discussion Topic</a:t>
-            </a:r>
-          </a:p>
-          <a:p>
-            <a:pPr marL="285750" indent="-285750">
-              <a:buFontTx/>
-              <a:buChar char="-"/>
-            </a:pPr>
-            <a:r>
-              <a:rPr lang="en-US" dirty="0"/>
-              <a:t>ID – Primary Key - int</a:t>
-            </a:r>
-          </a:p>
-          <a:p>
-            <a:pPr marL="285750" indent="-285750">
-              <a:buFontTx/>
-              <a:buChar char="-"/>
-            </a:pPr>
-            <a:r>
-              <a:rPr lang="en-US" dirty="0"/>
-              <a:t>Content – varchar</a:t>
-            </a:r>
-          </a:p>
-          <a:p>
-            <a:pPr marL="285750" indent="-285750">
-              <a:buFontTx/>
-              <a:buChar char="-"/>
-            </a:pPr>
-            <a:r>
-              <a:rPr lang="en-US" dirty="0" err="1"/>
-              <a:t>EmployeeID</a:t>
-            </a:r>
-            <a:r>
-              <a:rPr lang="en-US" dirty="0"/>
-              <a:t> – Foreign Key –int </a:t>
-            </a:r>
-          </a:p>
-        </p:txBody>
-      </p:sp>
-      <p:sp>
-        <p:nvSpPr>
-          <p:cNvPr id="5" name="TextBox 4"/>
-          <p:cNvSpPr txBox="1"/>
-          <p:nvPr/>
-        </p:nvSpPr>
-        <p:spPr>
-          <a:xfrm>
-            <a:off x="6624220" y="2426900"/>
-            <a:ext cx="2068497" cy="1754326"/>
-          </a:xfrm>
-          <a:prstGeom prst="rect">
-            <a:avLst/>
-          </a:prstGeom>
-        </p:spPr>
-        <p:style>
-          <a:lnRef idx="2">
-            <a:schemeClr val="dk1"/>
-          </a:lnRef>
-          <a:fillRef idx="1">
-            <a:schemeClr val="lt1"/>
-          </a:fillRef>
-          <a:effectRef idx="0">
-            <a:schemeClr val="dk1"/>
-          </a:effectRef>
-          <a:fontRef idx="minor">
-            <a:schemeClr val="dk1"/>
-          </a:fontRef>
-        </p:style>
-        <p:txBody>
-          <a:bodyPr wrap="square" rtlCol="0">
-            <a:spAutoFit/>
-          </a:bodyPr>
-          <a:lstStyle/>
-          <a:p>
-            <a:r>
-              <a:rPr lang="en-US" b="1" dirty="0"/>
-              <a:t>Employees</a:t>
-            </a:r>
-          </a:p>
-          <a:p>
-            <a:pPr marL="285750" indent="-285750">
-              <a:buFontTx/>
-              <a:buChar char="-"/>
-            </a:pPr>
-            <a:r>
-              <a:rPr lang="en-US" dirty="0"/>
-              <a:t>ID – Primary Key - int</a:t>
-            </a:r>
-          </a:p>
-          <a:p>
-            <a:pPr marL="285750" indent="-285750">
-              <a:buFontTx/>
-              <a:buChar char="-"/>
-            </a:pPr>
-            <a:r>
-              <a:rPr lang="en-US" dirty="0"/>
-              <a:t>Name – varchar</a:t>
-            </a:r>
-          </a:p>
-          <a:p>
-            <a:pPr marL="285750" indent="-285750">
-              <a:buFontTx/>
-              <a:buChar char="-"/>
-            </a:pPr>
-            <a:r>
-              <a:rPr lang="en-US" dirty="0"/>
-              <a:t>Department- varchar</a:t>
-            </a:r>
-          </a:p>
-        </p:txBody>
-      </p:sp>
-      <p:sp>
-        <p:nvSpPr>
-          <p:cNvPr id="6" name="TextBox 5"/>
-          <p:cNvSpPr txBox="1"/>
-          <p:nvPr/>
-        </p:nvSpPr>
-        <p:spPr>
-          <a:xfrm>
-            <a:off x="4324903" y="3955338"/>
-            <a:ext cx="2068497" cy="2308324"/>
-          </a:xfrm>
-          <a:prstGeom prst="rect">
-            <a:avLst/>
-          </a:prstGeom>
-        </p:spPr>
-        <p:style>
-          <a:lnRef idx="2">
-            <a:schemeClr val="dk1"/>
-          </a:lnRef>
-          <a:fillRef idx="1">
-            <a:schemeClr val="lt1"/>
-          </a:fillRef>
-          <a:effectRef idx="0">
-            <a:schemeClr val="dk1"/>
-          </a:effectRef>
-          <a:fontRef idx="minor">
-            <a:schemeClr val="dk1"/>
-          </a:fontRef>
-        </p:style>
-        <p:txBody>
-          <a:bodyPr wrap="square" rtlCol="0">
-            <a:spAutoFit/>
-          </a:bodyPr>
-          <a:lstStyle/>
-          <a:p>
-            <a:r>
-              <a:rPr lang="en-US" b="1" dirty="0"/>
-              <a:t>Comments</a:t>
-            </a:r>
-          </a:p>
-          <a:p>
-            <a:pPr marL="285750" indent="-285750">
-              <a:buFontTx/>
-              <a:buChar char="-"/>
-            </a:pPr>
-            <a:r>
-              <a:rPr lang="en-US" dirty="0"/>
-              <a:t>ID – Primary Key - int</a:t>
-            </a:r>
-          </a:p>
-          <a:p>
-            <a:pPr marL="285750" indent="-285750">
-              <a:buFontTx/>
-              <a:buChar char="-"/>
-            </a:pPr>
-            <a:r>
-              <a:rPr lang="en-US" dirty="0"/>
-              <a:t>Content – varchar</a:t>
-            </a:r>
-          </a:p>
-          <a:p>
-            <a:pPr marL="285750" indent="-285750">
-              <a:buFontTx/>
-              <a:buChar char="-"/>
-            </a:pPr>
-            <a:r>
-              <a:rPr lang="en-US" dirty="0" err="1"/>
-              <a:t>EmployeeID</a:t>
-            </a:r>
-            <a:r>
-              <a:rPr lang="en-US" dirty="0"/>
-              <a:t> – Foreign Key - int</a:t>
-            </a:r>
-          </a:p>
-          <a:p>
-            <a:pPr marL="285750" indent="-285750">
-              <a:buFontTx/>
-              <a:buChar char="-"/>
-            </a:pPr>
-            <a:r>
-              <a:rPr lang="en-US" dirty="0" err="1"/>
-              <a:t>DiscussionID</a:t>
-            </a:r>
-            <a:r>
-              <a:rPr lang="en-US" dirty="0"/>
-              <a:t> - int</a:t>
-            </a:r>
-          </a:p>
-        </p:txBody>
-      </p:sp>
-      <p:cxnSp>
-        <p:nvCxnSpPr>
-          <p:cNvPr id="8" name="Straight Arrow Connector 7"/>
-          <p:cNvCxnSpPr/>
-          <p:nvPr/>
-        </p:nvCxnSpPr>
-        <p:spPr>
-          <a:xfrm>
-            <a:off x="3719743" y="2867487"/>
-            <a:ext cx="2938509" cy="0"/>
-          </a:xfrm>
-          <a:prstGeom prst="straightConnector1">
-            <a:avLst/>
-          </a:prstGeom>
-          <a:ln w="28575">
-            <a:tailEnd type="triangle"/>
-          </a:ln>
-        </p:spPr>
-        <p:style>
-          <a:lnRef idx="1">
-            <a:schemeClr val="accent1"/>
-          </a:lnRef>
-          <a:fillRef idx="0">
-            <a:schemeClr val="accent1"/>
-          </a:fillRef>
-          <a:effectRef idx="0">
-            <a:schemeClr val="accent1"/>
-          </a:effectRef>
-          <a:fontRef idx="minor">
-            <a:schemeClr val="tx1"/>
-          </a:fontRef>
-        </p:style>
-      </p:cxnSp>
-      <p:cxnSp>
-        <p:nvCxnSpPr>
-          <p:cNvPr id="10" name="Straight Connector 9"/>
-          <p:cNvCxnSpPr/>
-          <p:nvPr/>
-        </p:nvCxnSpPr>
-        <p:spPr>
-          <a:xfrm flipH="1">
-            <a:off x="4057095" y="5548544"/>
-            <a:ext cx="267808" cy="0"/>
-          </a:xfrm>
-          <a:prstGeom prst="line">
-            <a:avLst/>
-          </a:prstGeom>
-          <a:ln w="28575"/>
-        </p:spPr>
-        <p:style>
-          <a:lnRef idx="1">
-            <a:schemeClr val="accent1"/>
-          </a:lnRef>
-          <a:fillRef idx="0">
-            <a:schemeClr val="accent1"/>
-          </a:fillRef>
-          <a:effectRef idx="0">
-            <a:schemeClr val="accent1"/>
-          </a:effectRef>
-          <a:fontRef idx="minor">
-            <a:schemeClr val="tx1"/>
-          </a:fontRef>
-        </p:style>
-      </p:cxnSp>
-      <p:cxnSp>
-        <p:nvCxnSpPr>
-          <p:cNvPr id="12" name="Straight Connector 11"/>
-          <p:cNvCxnSpPr/>
-          <p:nvPr/>
-        </p:nvCxnSpPr>
-        <p:spPr>
-          <a:xfrm flipV="1">
-            <a:off x="4065973" y="2263806"/>
-            <a:ext cx="0" cy="3293615"/>
-          </a:xfrm>
-          <a:prstGeom prst="line">
-            <a:avLst/>
-          </a:prstGeom>
-          <a:ln w="28575"/>
-        </p:spPr>
-        <p:style>
-          <a:lnRef idx="1">
-            <a:schemeClr val="accent1"/>
-          </a:lnRef>
-          <a:fillRef idx="0">
-            <a:schemeClr val="accent1"/>
-          </a:fillRef>
-          <a:effectRef idx="0">
-            <a:schemeClr val="accent1"/>
-          </a:effectRef>
-          <a:fontRef idx="minor">
-            <a:schemeClr val="tx1"/>
-          </a:fontRef>
-        </p:style>
-      </p:cxnSp>
-      <p:cxnSp>
-        <p:nvCxnSpPr>
-          <p:cNvPr id="14" name="Straight Arrow Connector 13"/>
-          <p:cNvCxnSpPr/>
-          <p:nvPr/>
-        </p:nvCxnSpPr>
-        <p:spPr>
-          <a:xfrm flipH="1">
-            <a:off x="3719743" y="2272684"/>
-            <a:ext cx="337352" cy="0"/>
-          </a:xfrm>
-          <a:prstGeom prst="straightConnector1">
-            <a:avLst/>
-          </a:prstGeom>
-          <a:ln w="28575">
-            <a:tailEnd type="triangle"/>
-          </a:ln>
-        </p:spPr>
-        <p:style>
-          <a:lnRef idx="1">
-            <a:schemeClr val="accent1"/>
-          </a:lnRef>
-          <a:fillRef idx="0">
-            <a:schemeClr val="accent1"/>
-          </a:fillRef>
-          <a:effectRef idx="0">
-            <a:schemeClr val="accent1"/>
-          </a:effectRef>
-          <a:fontRef idx="minor">
-            <a:schemeClr val="tx1"/>
-          </a:fontRef>
-        </p:style>
-      </p:cxnSp>
-      <p:cxnSp>
-        <p:nvCxnSpPr>
-          <p:cNvPr id="16" name="Straight Connector 15"/>
-          <p:cNvCxnSpPr/>
-          <p:nvPr/>
-        </p:nvCxnSpPr>
-        <p:spPr>
-          <a:xfrm>
-            <a:off x="6393400" y="5007006"/>
-            <a:ext cx="2981419" cy="0"/>
-          </a:xfrm>
-          <a:prstGeom prst="line">
-            <a:avLst/>
-          </a:prstGeom>
-          <a:ln w="28575"/>
-        </p:spPr>
-        <p:style>
-          <a:lnRef idx="1">
-            <a:schemeClr val="accent1"/>
-          </a:lnRef>
-          <a:fillRef idx="0">
-            <a:schemeClr val="accent1"/>
-          </a:fillRef>
-          <a:effectRef idx="0">
-            <a:schemeClr val="accent1"/>
-          </a:effectRef>
-          <a:fontRef idx="minor">
-            <a:schemeClr val="tx1"/>
-          </a:fontRef>
-        </p:style>
-      </p:cxnSp>
-      <p:cxnSp>
-        <p:nvCxnSpPr>
-          <p:cNvPr id="18" name="Straight Connector 17"/>
-          <p:cNvCxnSpPr/>
-          <p:nvPr/>
-        </p:nvCxnSpPr>
-        <p:spPr>
-          <a:xfrm flipV="1">
-            <a:off x="9374818" y="2876365"/>
-            <a:ext cx="0" cy="2121764"/>
-          </a:xfrm>
-          <a:prstGeom prst="line">
-            <a:avLst/>
-          </a:prstGeom>
-          <a:ln w="28575"/>
-        </p:spPr>
-        <p:style>
-          <a:lnRef idx="1">
-            <a:schemeClr val="accent1"/>
-          </a:lnRef>
-          <a:fillRef idx="0">
-            <a:schemeClr val="accent1"/>
-          </a:fillRef>
-          <a:effectRef idx="0">
-            <a:schemeClr val="accent1"/>
-          </a:effectRef>
-          <a:fontRef idx="minor">
-            <a:schemeClr val="tx1"/>
-          </a:fontRef>
-        </p:style>
-      </p:cxnSp>
-      <p:cxnSp>
-        <p:nvCxnSpPr>
-          <p:cNvPr id="21" name="Straight Arrow Connector 20"/>
-          <p:cNvCxnSpPr/>
-          <p:nvPr/>
-        </p:nvCxnSpPr>
-        <p:spPr>
-          <a:xfrm flipH="1">
-            <a:off x="8692717" y="2876365"/>
-            <a:ext cx="682101" cy="0"/>
-          </a:xfrm>
-          <a:prstGeom prst="straightConnector1">
-            <a:avLst/>
-          </a:prstGeom>
-          <a:ln w="28575">
-            <a:tailEnd type="triangle"/>
-          </a:ln>
-        </p:spPr>
-        <p:style>
-          <a:lnRef idx="1">
-            <a:schemeClr val="accent1"/>
-          </a:lnRef>
-          <a:fillRef idx="0">
-            <a:schemeClr val="accent1"/>
-          </a:fillRef>
-          <a:effectRef idx="0">
-            <a:schemeClr val="accent1"/>
-          </a:effectRef>
-          <a:fontRef idx="minor">
-            <a:schemeClr val="tx1"/>
-          </a:fontRef>
-        </p:style>
-      </p:cxnSp>
-    </p:spTree>
-  </p:cSld>
-  <p:clrMapOvr>
-    <a:masterClrMapping/>
-  </p:clrMapOvr>
-</p:sld>
-</file>
-
 <file path=ppt/theme/theme1.xml><?xml version="1.0" encoding="utf-8"?>
 <a:theme xmlns:a="http://schemas.openxmlformats.org/drawingml/2006/main" name="Office Theme">
   <a:themeElements>

</xml_diff>